<commit_message>
Add unit test for todo app. Add test for minified of HtmlJs Modify API of html.data. Remove some of useless functions. Use properties instead for improving performance
</commit_message>
<xml_diff>
--- a/api/guideline/How_does_it_work.pptx
+++ b/api/guideline/How_does_it_work.pptx
@@ -234,7 +234,7 @@
           <a:p>
             <a:fld id="{52BABEF1-497C-4B3F-A7D8-3B88CC792D4A}" type="datetimeFigureOut">
               <a:rPr lang="en-US" smtClean="0"/>
-              <a:t>3/15/2015</a:t>
+              <a:t>3/19/2015</a:t>
             </a:fld>
             <a:endParaRPr lang="en-US"/>
           </a:p>
@@ -399,7 +399,7 @@
           <a:p>
             <a:fld id="{A947FEFB-8526-4656-93DE-B2B6B615FA47}" type="datetimeFigureOut">
               <a:rPr lang="en-US" smtClean="0"/>
-              <a:t>3/15/2015</a:t>
+              <a:t>3/19/2015</a:t>
             </a:fld>
             <a:endParaRPr lang="en-US"/>
           </a:p>
@@ -892,7 +892,7 @@
           <a:noFill/>
           <a:extLst>
             <a:ext uri="{909E8E84-426E-40dd-AFC4-6F175D3DCCD1}">
-              <a14:hiddenFill xmlns="" xmlns:a14="http://schemas.microsoft.com/office/drawing/2010/main">
+              <a14:hiddenFill xmlns:a14="http://schemas.microsoft.com/office/drawing/2010/main" xmlns="">
                 <a:solidFill>
                   <a:srgbClr val="FFFFFF"/>
                 </a:solidFill>
@@ -951,7 +951,7 @@
             </a:ln>
             <a:extLst>
               <a:ext uri="{91240B29-F687-4f45-9708-019B960494DF}">
-                <a14:hiddenLine xmlns="" xmlns:a14="http://schemas.microsoft.com/office/drawing/2010/main" w="9525">
+                <a14:hiddenLine xmlns:a14="http://schemas.microsoft.com/office/drawing/2010/main" xmlns="" w="9525">
                   <a:solidFill>
                     <a:srgbClr val="000000"/>
                   </a:solidFill>
@@ -1041,7 +1041,7 @@
             </a:ln>
             <a:extLst>
               <a:ext uri="{91240B29-F687-4f45-9708-019B960494DF}">
-                <a14:hiddenLine xmlns="" xmlns:a14="http://schemas.microsoft.com/office/drawing/2010/main" w="9525">
+                <a14:hiddenLine xmlns:a14="http://schemas.microsoft.com/office/drawing/2010/main" xmlns="" w="9525">
                   <a:solidFill>
                     <a:srgbClr val="000000"/>
                   </a:solidFill>
@@ -1131,7 +1131,7 @@
             </a:ln>
             <a:extLst>
               <a:ext uri="{91240B29-F687-4f45-9708-019B960494DF}">
-                <a14:hiddenLine xmlns="" xmlns:a14="http://schemas.microsoft.com/office/drawing/2010/main" w="9525">
+                <a14:hiddenLine xmlns:a14="http://schemas.microsoft.com/office/drawing/2010/main" xmlns="" w="9525">
                   <a:solidFill>
                     <a:srgbClr val="000000"/>
                   </a:solidFill>
@@ -1165,7 +1165,7 @@
             </a:ln>
             <a:extLst>
               <a:ext uri="{91240B29-F687-4f45-9708-019B960494DF}">
-                <a14:hiddenLine xmlns="" xmlns:a14="http://schemas.microsoft.com/office/drawing/2010/main" w="9525">
+                <a14:hiddenLine xmlns:a14="http://schemas.microsoft.com/office/drawing/2010/main" xmlns="" w="9525">
                   <a:solidFill>
                     <a:srgbClr val="000000"/>
                   </a:solidFill>
@@ -1255,7 +1255,7 @@
             </a:ln>
             <a:extLst>
               <a:ext uri="{91240B29-F687-4f45-9708-019B960494DF}">
-                <a14:hiddenLine xmlns="" xmlns:a14="http://schemas.microsoft.com/office/drawing/2010/main" w="9525">
+                <a14:hiddenLine xmlns:a14="http://schemas.microsoft.com/office/drawing/2010/main" xmlns="" w="9525">
                   <a:solidFill>
                     <a:srgbClr val="000000"/>
                   </a:solidFill>
@@ -1317,7 +1317,7 @@
             </a:ln>
             <a:extLst>
               <a:ext uri="{91240B29-F687-4f45-9708-019B960494DF}">
-                <a14:hiddenLine xmlns="" xmlns:a14="http://schemas.microsoft.com/office/drawing/2010/main" w="9525">
+                <a14:hiddenLine xmlns:a14="http://schemas.microsoft.com/office/drawing/2010/main" xmlns="" w="9525">
                   <a:solidFill>
                     <a:srgbClr val="000000"/>
                   </a:solidFill>
@@ -1379,7 +1379,7 @@
             </a:ln>
             <a:extLst>
               <a:ext uri="{91240B29-F687-4f45-9708-019B960494DF}">
-                <a14:hiddenLine xmlns="" xmlns:a14="http://schemas.microsoft.com/office/drawing/2010/main" w="9525">
+                <a14:hiddenLine xmlns:a14="http://schemas.microsoft.com/office/drawing/2010/main" xmlns="" w="9525">
                   <a:solidFill>
                     <a:srgbClr val="000000"/>
                   </a:solidFill>
@@ -1469,7 +1469,7 @@
             </a:ln>
             <a:extLst>
               <a:ext uri="{91240B29-F687-4f45-9708-019B960494DF}">
-                <a14:hiddenLine xmlns="" xmlns:a14="http://schemas.microsoft.com/office/drawing/2010/main" w="9525">
+                <a14:hiddenLine xmlns:a14="http://schemas.microsoft.com/office/drawing/2010/main" xmlns="" w="9525">
                   <a:solidFill>
                     <a:srgbClr val="000000"/>
                   </a:solidFill>
@@ -1531,7 +1531,7 @@
             </a:ln>
             <a:extLst>
               <a:ext uri="{91240B29-F687-4f45-9708-019B960494DF}">
-                <a14:hiddenLine xmlns="" xmlns:a14="http://schemas.microsoft.com/office/drawing/2010/main" w="9525">
+                <a14:hiddenLine xmlns:a14="http://schemas.microsoft.com/office/drawing/2010/main" xmlns="" w="9525">
                   <a:solidFill>
                     <a:srgbClr val="000000"/>
                   </a:solidFill>
@@ -1593,7 +1593,7 @@
             </a:ln>
             <a:extLst>
               <a:ext uri="{91240B29-F687-4f45-9708-019B960494DF}">
-                <a14:hiddenLine xmlns="" xmlns:a14="http://schemas.microsoft.com/office/drawing/2010/main" w="9525">
+                <a14:hiddenLine xmlns:a14="http://schemas.microsoft.com/office/drawing/2010/main" xmlns="" w="9525">
                   <a:solidFill>
                     <a:srgbClr val="000000"/>
                   </a:solidFill>
@@ -1683,7 +1683,7 @@
             </a:ln>
             <a:extLst>
               <a:ext uri="{91240B29-F687-4f45-9708-019B960494DF}">
-                <a14:hiddenLine xmlns="" xmlns:a14="http://schemas.microsoft.com/office/drawing/2010/main" w="9525">
+                <a14:hiddenLine xmlns:a14="http://schemas.microsoft.com/office/drawing/2010/main" xmlns="" w="9525">
                   <a:solidFill>
                     <a:srgbClr val="000000"/>
                   </a:solidFill>
@@ -1773,7 +1773,7 @@
             </a:ln>
             <a:extLst>
               <a:ext uri="{91240B29-F687-4f45-9708-019B960494DF}">
-                <a14:hiddenLine xmlns="" xmlns:a14="http://schemas.microsoft.com/office/drawing/2010/main" w="9525">
+                <a14:hiddenLine xmlns:a14="http://schemas.microsoft.com/office/drawing/2010/main" xmlns="" w="9525">
                   <a:solidFill>
                     <a:srgbClr val="000000"/>
                   </a:solidFill>
@@ -1835,7 +1835,7 @@
             </a:ln>
             <a:extLst>
               <a:ext uri="{91240B29-F687-4f45-9708-019B960494DF}">
-                <a14:hiddenLine xmlns="" xmlns:a14="http://schemas.microsoft.com/office/drawing/2010/main" w="9525">
+                <a14:hiddenLine xmlns:a14="http://schemas.microsoft.com/office/drawing/2010/main" xmlns="" w="9525">
                   <a:solidFill>
                     <a:srgbClr val="000000"/>
                   </a:solidFill>
@@ -1945,7 +1945,7 @@
             </a:ln>
             <a:extLst>
               <a:ext uri="{91240B29-F687-4f45-9708-019B960494DF}">
-                <a14:hiddenLine xmlns="" xmlns:a14="http://schemas.microsoft.com/office/drawing/2010/main" w="9525">
+                <a14:hiddenLine xmlns:a14="http://schemas.microsoft.com/office/drawing/2010/main" xmlns="" w="9525">
                   <a:solidFill>
                     <a:srgbClr val="000000"/>
                   </a:solidFill>
@@ -2007,7 +2007,7 @@
             </a:ln>
             <a:extLst>
               <a:ext uri="{91240B29-F687-4f45-9708-019B960494DF}">
-                <a14:hiddenLine xmlns="" xmlns:a14="http://schemas.microsoft.com/office/drawing/2010/main" w="9525">
+                <a14:hiddenLine xmlns:a14="http://schemas.microsoft.com/office/drawing/2010/main" xmlns="" w="9525">
                   <a:solidFill>
                     <a:srgbClr val="000000"/>
                   </a:solidFill>
@@ -2097,7 +2097,7 @@
             </a:ln>
             <a:extLst>
               <a:ext uri="{91240B29-F687-4f45-9708-019B960494DF}">
-                <a14:hiddenLine xmlns="" xmlns:a14="http://schemas.microsoft.com/office/drawing/2010/main" w="9525">
+                <a14:hiddenLine xmlns:a14="http://schemas.microsoft.com/office/drawing/2010/main" xmlns="" w="9525">
                   <a:solidFill>
                     <a:srgbClr val="000000"/>
                   </a:solidFill>
@@ -2187,7 +2187,7 @@
             </a:ln>
             <a:extLst>
               <a:ext uri="{91240B29-F687-4f45-9708-019B960494DF}">
-                <a14:hiddenLine xmlns="" xmlns:a14="http://schemas.microsoft.com/office/drawing/2010/main" w="9525">
+                <a14:hiddenLine xmlns:a14="http://schemas.microsoft.com/office/drawing/2010/main" xmlns="" w="9525">
                   <a:solidFill>
                     <a:srgbClr val="000000"/>
                   </a:solidFill>
@@ -2249,7 +2249,7 @@
             </a:ln>
             <a:extLst>
               <a:ext uri="{91240B29-F687-4f45-9708-019B960494DF}">
-                <a14:hiddenLine xmlns="" xmlns:a14="http://schemas.microsoft.com/office/drawing/2010/main" w="9525">
+                <a14:hiddenLine xmlns:a14="http://schemas.microsoft.com/office/drawing/2010/main" xmlns="" w="9525">
                   <a:solidFill>
                     <a:srgbClr val="000000"/>
                   </a:solidFill>
@@ -2339,7 +2339,7 @@
             </a:ln>
             <a:extLst>
               <a:ext uri="{91240B29-F687-4f45-9708-019B960494DF}">
-                <a14:hiddenLine xmlns="" xmlns:a14="http://schemas.microsoft.com/office/drawing/2010/main" w="9525">
+                <a14:hiddenLine xmlns:a14="http://schemas.microsoft.com/office/drawing/2010/main" xmlns="" w="9525">
                   <a:solidFill>
                     <a:srgbClr val="000000"/>
                   </a:solidFill>
@@ -2429,7 +2429,7 @@
             </a:ln>
             <a:extLst>
               <a:ext uri="{91240B29-F687-4f45-9708-019B960494DF}">
-                <a14:hiddenLine xmlns="" xmlns:a14="http://schemas.microsoft.com/office/drawing/2010/main" w="9525">
+                <a14:hiddenLine xmlns:a14="http://schemas.microsoft.com/office/drawing/2010/main" xmlns="" w="9525">
                   <a:solidFill>
                     <a:srgbClr val="000000"/>
                   </a:solidFill>
@@ -2485,7 +2485,7 @@
             </a:ln>
             <a:extLst>
               <a:ext uri="{91240B29-F687-4f45-9708-019B960494DF}">
-                <a14:hiddenLine xmlns="" xmlns:a14="http://schemas.microsoft.com/office/drawing/2010/main" w="9525">
+                <a14:hiddenLine xmlns:a14="http://schemas.microsoft.com/office/drawing/2010/main" xmlns="" w="9525">
                   <a:solidFill>
                     <a:srgbClr val="000000"/>
                   </a:solidFill>
@@ -2575,7 +2575,7 @@
             </a:ln>
             <a:extLst>
               <a:ext uri="{91240B29-F687-4f45-9708-019B960494DF}">
-                <a14:hiddenLine xmlns="" xmlns:a14="http://schemas.microsoft.com/office/drawing/2010/main" w="9525">
+                <a14:hiddenLine xmlns:a14="http://schemas.microsoft.com/office/drawing/2010/main" xmlns="" w="9525">
                   <a:solidFill>
                     <a:srgbClr val="000000"/>
                   </a:solidFill>
@@ -2631,7 +2631,7 @@
             </a:ln>
             <a:extLst>
               <a:ext uri="{91240B29-F687-4f45-9708-019B960494DF}">
-                <a14:hiddenLine xmlns="" xmlns:a14="http://schemas.microsoft.com/office/drawing/2010/main" w="9525">
+                <a14:hiddenLine xmlns:a14="http://schemas.microsoft.com/office/drawing/2010/main" xmlns="" w="9525">
                   <a:solidFill>
                     <a:srgbClr val="000000"/>
                   </a:solidFill>
@@ -2721,7 +2721,7 @@
             </a:ln>
             <a:extLst>
               <a:ext uri="{91240B29-F687-4f45-9708-019B960494DF}">
-                <a14:hiddenLine xmlns="" xmlns:a14="http://schemas.microsoft.com/office/drawing/2010/main" w="9525">
+                <a14:hiddenLine xmlns:a14="http://schemas.microsoft.com/office/drawing/2010/main" xmlns="" w="9525">
                   <a:solidFill>
                     <a:srgbClr val="000000"/>
                   </a:solidFill>
@@ -2789,7 +2789,7 @@
             </a:ln>
             <a:extLst>
               <a:ext uri="{91240B29-F687-4f45-9708-019B960494DF}">
-                <a14:hiddenLine xmlns="" xmlns:a14="http://schemas.microsoft.com/office/drawing/2010/main" w="9525">
+                <a14:hiddenLine xmlns:a14="http://schemas.microsoft.com/office/drawing/2010/main" xmlns="" w="9525">
                   <a:solidFill>
                     <a:srgbClr val="000000"/>
                   </a:solidFill>
@@ -2879,7 +2879,7 @@
             </a:ln>
             <a:extLst>
               <a:ext uri="{91240B29-F687-4f45-9708-019B960494DF}">
-                <a14:hiddenLine xmlns="" xmlns:a14="http://schemas.microsoft.com/office/drawing/2010/main" w="9525">
+                <a14:hiddenLine xmlns:a14="http://schemas.microsoft.com/office/drawing/2010/main" xmlns="" w="9525">
                   <a:solidFill>
                     <a:srgbClr val="000000"/>
                   </a:solidFill>
@@ -2947,7 +2947,7 @@
             </a:ln>
             <a:extLst>
               <a:ext uri="{91240B29-F687-4f45-9708-019B960494DF}">
-                <a14:hiddenLine xmlns="" xmlns:a14="http://schemas.microsoft.com/office/drawing/2010/main" w="9525">
+                <a14:hiddenLine xmlns:a14="http://schemas.microsoft.com/office/drawing/2010/main" xmlns="" w="9525">
                   <a:solidFill>
                     <a:srgbClr val="000000"/>
                   </a:solidFill>
@@ -3037,7 +3037,7 @@
             </a:ln>
             <a:extLst>
               <a:ext uri="{91240B29-F687-4f45-9708-019B960494DF}">
-                <a14:hiddenLine xmlns="" xmlns:a14="http://schemas.microsoft.com/office/drawing/2010/main" w="9525">
+                <a14:hiddenLine xmlns:a14="http://schemas.microsoft.com/office/drawing/2010/main" xmlns="" w="9525">
                   <a:solidFill>
                     <a:srgbClr val="000000"/>
                   </a:solidFill>
@@ -3071,7 +3071,7 @@
             </a:ln>
             <a:extLst>
               <a:ext uri="{91240B29-F687-4f45-9708-019B960494DF}">
-                <a14:hiddenLine xmlns="" xmlns:a14="http://schemas.microsoft.com/office/drawing/2010/main" w="9525">
+                <a14:hiddenLine xmlns:a14="http://schemas.microsoft.com/office/drawing/2010/main" xmlns="" w="9525">
                   <a:solidFill>
                     <a:srgbClr val="000000"/>
                   </a:solidFill>
@@ -3161,7 +3161,7 @@
             </a:ln>
             <a:extLst>
               <a:ext uri="{91240B29-F687-4f45-9708-019B960494DF}">
-                <a14:hiddenLine xmlns="" xmlns:a14="http://schemas.microsoft.com/office/drawing/2010/main" w="9525">
+                <a14:hiddenLine xmlns:a14="http://schemas.microsoft.com/office/drawing/2010/main" xmlns="" w="9525">
                   <a:solidFill>
                     <a:srgbClr val="000000"/>
                   </a:solidFill>
@@ -3223,7 +3223,7 @@
             </a:ln>
             <a:extLst>
               <a:ext uri="{91240B29-F687-4f45-9708-019B960494DF}">
-                <a14:hiddenLine xmlns="" xmlns:a14="http://schemas.microsoft.com/office/drawing/2010/main" w="9525">
+                <a14:hiddenLine xmlns:a14="http://schemas.microsoft.com/office/drawing/2010/main" xmlns="" w="9525">
                   <a:solidFill>
                     <a:srgbClr val="000000"/>
                   </a:solidFill>
@@ -3285,7 +3285,7 @@
             </a:ln>
             <a:extLst>
               <a:ext uri="{91240B29-F687-4f45-9708-019B960494DF}">
-                <a14:hiddenLine xmlns="" xmlns:a14="http://schemas.microsoft.com/office/drawing/2010/main" w="9525">
+                <a14:hiddenLine xmlns:a14="http://schemas.microsoft.com/office/drawing/2010/main" xmlns="" w="9525">
                   <a:solidFill>
                     <a:srgbClr val="000000"/>
                   </a:solidFill>
@@ -3375,7 +3375,7 @@
             </a:ln>
             <a:extLst>
               <a:ext uri="{91240B29-F687-4f45-9708-019B960494DF}">
-                <a14:hiddenLine xmlns="" xmlns:a14="http://schemas.microsoft.com/office/drawing/2010/main" w="9525">
+                <a14:hiddenLine xmlns:a14="http://schemas.microsoft.com/office/drawing/2010/main" xmlns="" w="9525">
                   <a:solidFill>
                     <a:srgbClr val="000000"/>
                   </a:solidFill>
@@ -3443,7 +3443,7 @@
             </a:ln>
             <a:extLst>
               <a:ext uri="{91240B29-F687-4f45-9708-019B960494DF}">
-                <a14:hiddenLine xmlns="" xmlns:a14="http://schemas.microsoft.com/office/drawing/2010/main" w="9525">
+                <a14:hiddenLine xmlns:a14="http://schemas.microsoft.com/office/drawing/2010/main" xmlns="" w="9525">
                   <a:solidFill>
                     <a:srgbClr val="000000"/>
                   </a:solidFill>
@@ -3505,7 +3505,7 @@
             </a:ln>
             <a:extLst>
               <a:ext uri="{91240B29-F687-4f45-9708-019B960494DF}">
-                <a14:hiddenLine xmlns="" xmlns:a14="http://schemas.microsoft.com/office/drawing/2010/main" w="9525">
+                <a14:hiddenLine xmlns:a14="http://schemas.microsoft.com/office/drawing/2010/main" xmlns="" w="9525">
                   <a:solidFill>
                     <a:srgbClr val="000000"/>
                   </a:solidFill>
@@ -3595,7 +3595,7 @@
             </a:ln>
             <a:extLst>
               <a:ext uri="{91240B29-F687-4f45-9708-019B960494DF}">
-                <a14:hiddenLine xmlns="" xmlns:a14="http://schemas.microsoft.com/office/drawing/2010/main" w="9525">
+                <a14:hiddenLine xmlns:a14="http://schemas.microsoft.com/office/drawing/2010/main" xmlns="" w="9525">
                   <a:solidFill>
                     <a:srgbClr val="000000"/>
                   </a:solidFill>
@@ -3657,7 +3657,7 @@
             </a:ln>
             <a:extLst>
               <a:ext uri="{91240B29-F687-4f45-9708-019B960494DF}">
-                <a14:hiddenLine xmlns="" xmlns:a14="http://schemas.microsoft.com/office/drawing/2010/main" w="9525">
+                <a14:hiddenLine xmlns:a14="http://schemas.microsoft.com/office/drawing/2010/main" xmlns="" w="9525">
                   <a:solidFill>
                     <a:srgbClr val="000000"/>
                   </a:solidFill>
@@ -3747,7 +3747,7 @@
             </a:ln>
             <a:extLst>
               <a:ext uri="{91240B29-F687-4f45-9708-019B960494DF}">
-                <a14:hiddenLine xmlns="" xmlns:a14="http://schemas.microsoft.com/office/drawing/2010/main" w="9525">
+                <a14:hiddenLine xmlns:a14="http://schemas.microsoft.com/office/drawing/2010/main" xmlns="" w="9525">
                   <a:solidFill>
                     <a:srgbClr val="000000"/>
                   </a:solidFill>
@@ -3809,7 +3809,7 @@
             </a:ln>
             <a:extLst>
               <a:ext uri="{91240B29-F687-4f45-9708-019B960494DF}">
-                <a14:hiddenLine xmlns="" xmlns:a14="http://schemas.microsoft.com/office/drawing/2010/main" w="9525">
+                <a14:hiddenLine xmlns:a14="http://schemas.microsoft.com/office/drawing/2010/main" xmlns="" w="9525">
                   <a:solidFill>
                     <a:srgbClr val="000000"/>
                   </a:solidFill>
@@ -3899,7 +3899,7 @@
             </a:ln>
             <a:extLst>
               <a:ext uri="{91240B29-F687-4f45-9708-019B960494DF}">
-                <a14:hiddenLine xmlns="" xmlns:a14="http://schemas.microsoft.com/office/drawing/2010/main" w="9525">
+                <a14:hiddenLine xmlns:a14="http://schemas.microsoft.com/office/drawing/2010/main" xmlns="" w="9525">
                   <a:solidFill>
                     <a:srgbClr val="000000"/>
                   </a:solidFill>
@@ -3933,7 +3933,7 @@
             </a:ln>
             <a:extLst>
               <a:ext uri="{91240B29-F687-4f45-9708-019B960494DF}">
-                <a14:hiddenLine xmlns="" xmlns:a14="http://schemas.microsoft.com/office/drawing/2010/main" w="9525">
+                <a14:hiddenLine xmlns:a14="http://schemas.microsoft.com/office/drawing/2010/main" xmlns="" w="9525">
                   <a:solidFill>
                     <a:srgbClr val="000000"/>
                   </a:solidFill>
@@ -3998,7 +3998,7 @@
             </a:ln>
             <a:extLst>
               <a:ext uri="{91240B29-F687-4f45-9708-019B960494DF}">
-                <a14:hiddenLine xmlns="" xmlns:a14="http://schemas.microsoft.com/office/drawing/2010/main" w="9525">
+                <a14:hiddenLine xmlns:a14="http://schemas.microsoft.com/office/drawing/2010/main" xmlns="" w="9525">
                   <a:solidFill>
                     <a:srgbClr val="000000"/>
                   </a:solidFill>
@@ -4088,7 +4088,7 @@
             </a:ln>
             <a:extLst>
               <a:ext uri="{91240B29-F687-4f45-9708-019B960494DF}">
-                <a14:hiddenLine xmlns="" xmlns:a14="http://schemas.microsoft.com/office/drawing/2010/main" w="9525">
+                <a14:hiddenLine xmlns:a14="http://schemas.microsoft.com/office/drawing/2010/main" xmlns="" w="9525">
                   <a:solidFill>
                     <a:srgbClr val="000000"/>
                   </a:solidFill>
@@ -4150,7 +4150,7 @@
             </a:ln>
             <a:extLst>
               <a:ext uri="{91240B29-F687-4f45-9708-019B960494DF}">
-                <a14:hiddenLine xmlns="" xmlns:a14="http://schemas.microsoft.com/office/drawing/2010/main" w="9525">
+                <a14:hiddenLine xmlns:a14="http://schemas.microsoft.com/office/drawing/2010/main" xmlns="" w="9525">
                   <a:solidFill>
                     <a:srgbClr val="000000"/>
                   </a:solidFill>
@@ -4240,7 +4240,7 @@
             </a:ln>
             <a:extLst>
               <a:ext uri="{91240B29-F687-4f45-9708-019B960494DF}">
-                <a14:hiddenLine xmlns="" xmlns:a14="http://schemas.microsoft.com/office/drawing/2010/main" w="9525">
+                <a14:hiddenLine xmlns:a14="http://schemas.microsoft.com/office/drawing/2010/main" xmlns="" w="9525">
                   <a:solidFill>
                     <a:srgbClr val="000000"/>
                   </a:solidFill>
@@ -4330,7 +4330,7 @@
             </a:ln>
             <a:extLst>
               <a:ext uri="{91240B29-F687-4f45-9708-019B960494DF}">
-                <a14:hiddenLine xmlns="" xmlns:a14="http://schemas.microsoft.com/office/drawing/2010/main" w="9525">
+                <a14:hiddenLine xmlns:a14="http://schemas.microsoft.com/office/drawing/2010/main" xmlns="" w="9525">
                   <a:solidFill>
                     <a:srgbClr val="000000"/>
                   </a:solidFill>
@@ -4395,7 +4395,7 @@
             </a:ln>
             <a:extLst>
               <a:ext uri="{91240B29-F687-4f45-9708-019B960494DF}">
-                <a14:hiddenLine xmlns="" xmlns:a14="http://schemas.microsoft.com/office/drawing/2010/main" w="9525">
+                <a14:hiddenLine xmlns:a14="http://schemas.microsoft.com/office/drawing/2010/main" xmlns="" w="9525">
                   <a:solidFill>
                     <a:srgbClr val="000000"/>
                   </a:solidFill>
@@ -4457,7 +4457,7 @@
             </a:ln>
             <a:extLst>
               <a:ext uri="{91240B29-F687-4f45-9708-019B960494DF}">
-                <a14:hiddenLine xmlns="" xmlns:a14="http://schemas.microsoft.com/office/drawing/2010/main" w="9525">
+                <a14:hiddenLine xmlns:a14="http://schemas.microsoft.com/office/drawing/2010/main" xmlns="" w="9525">
                   <a:solidFill>
                     <a:srgbClr val="000000"/>
                   </a:solidFill>
@@ -4547,7 +4547,7 @@
             </a:ln>
             <a:extLst>
               <a:ext uri="{91240B29-F687-4f45-9708-019B960494DF}">
-                <a14:hiddenLine xmlns="" xmlns:a14="http://schemas.microsoft.com/office/drawing/2010/main" w="9525">
+                <a14:hiddenLine xmlns:a14="http://schemas.microsoft.com/office/drawing/2010/main" xmlns="" w="9525">
                   <a:solidFill>
                     <a:srgbClr val="000000"/>
                   </a:solidFill>
@@ -4637,7 +4637,7 @@
             </a:ln>
             <a:extLst>
               <a:ext uri="{91240B29-F687-4f45-9708-019B960494DF}">
-                <a14:hiddenLine xmlns="" xmlns:a14="http://schemas.microsoft.com/office/drawing/2010/main" w="9525">
+                <a14:hiddenLine xmlns:a14="http://schemas.microsoft.com/office/drawing/2010/main" xmlns="" w="9525">
                   <a:solidFill>
                     <a:srgbClr val="000000"/>
                   </a:solidFill>
@@ -4699,7 +4699,7 @@
             </a:ln>
             <a:extLst>
               <a:ext uri="{91240B29-F687-4f45-9708-019B960494DF}">
-                <a14:hiddenLine xmlns="" xmlns:a14="http://schemas.microsoft.com/office/drawing/2010/main" w="9525">
+                <a14:hiddenLine xmlns:a14="http://schemas.microsoft.com/office/drawing/2010/main" xmlns="" w="9525">
                   <a:solidFill>
                     <a:srgbClr val="000000"/>
                   </a:solidFill>
@@ -4819,7 +4819,7 @@
             </a:ln>
             <a:extLst>
               <a:ext uri="{91240B29-F687-4f45-9708-019B960494DF}">
-                <a14:hiddenLine xmlns="" xmlns:a14="http://schemas.microsoft.com/office/drawing/2010/main" w="9525">
+                <a14:hiddenLine xmlns:a14="http://schemas.microsoft.com/office/drawing/2010/main" xmlns="" w="9525">
                   <a:solidFill>
                     <a:srgbClr val="000000"/>
                   </a:solidFill>
@@ -4887,7 +4887,7 @@
             </a:ln>
             <a:extLst>
               <a:ext uri="{91240B29-F687-4f45-9708-019B960494DF}">
-                <a14:hiddenLine xmlns="" xmlns:a14="http://schemas.microsoft.com/office/drawing/2010/main" w="9525">
+                <a14:hiddenLine xmlns:a14="http://schemas.microsoft.com/office/drawing/2010/main" xmlns="" w="9525">
                   <a:solidFill>
                     <a:srgbClr val="000000"/>
                   </a:solidFill>
@@ -4977,7 +4977,7 @@
             </a:ln>
             <a:extLst>
               <a:ext uri="{91240B29-F687-4f45-9708-019B960494DF}">
-                <a14:hiddenLine xmlns="" xmlns:a14="http://schemas.microsoft.com/office/drawing/2010/main" w="9525">
+                <a14:hiddenLine xmlns:a14="http://schemas.microsoft.com/office/drawing/2010/main" xmlns="" w="9525">
                   <a:solidFill>
                     <a:srgbClr val="000000"/>
                   </a:solidFill>
@@ -5117,7 +5117,7 @@
           <a:p>
             <a:fld id="{DF03AFA7-18AD-4B78-BBAA-32988282C785}" type="datetimeFigureOut">
               <a:rPr lang="en-US" smtClean="0"/>
-              <a:t>3/15/2015</a:t>
+              <a:t>3/19/2015</a:t>
             </a:fld>
             <a:endParaRPr lang="en-US"/>
           </a:p>
@@ -5432,7 +5432,7 @@
           <a:p>
             <a:fld id="{DF03AFA7-18AD-4B78-BBAA-32988282C785}" type="datetimeFigureOut">
               <a:rPr lang="en-US" smtClean="0"/>
-              <a:t>3/15/2015</a:t>
+              <a:t>3/19/2015</a:t>
             </a:fld>
             <a:endParaRPr lang="en-US"/>
           </a:p>
@@ -5628,7 +5628,7 @@
           <a:p>
             <a:fld id="{DF03AFA7-18AD-4B78-BBAA-32988282C785}" type="datetimeFigureOut">
               <a:rPr lang="en-US" smtClean="0"/>
-              <a:t>3/15/2015</a:t>
+              <a:t>3/19/2015</a:t>
             </a:fld>
             <a:endParaRPr lang="en-US"/>
           </a:p>
@@ -5891,7 +5891,7 @@
           <a:p>
             <a:fld id="{DF03AFA7-18AD-4B78-BBAA-32988282C785}" type="datetimeFigureOut">
               <a:rPr lang="en-US" smtClean="0"/>
-              <a:t>3/15/2015</a:t>
+              <a:t>3/19/2015</a:t>
             </a:fld>
             <a:endParaRPr lang="en-US"/>
           </a:p>
@@ -6325,7 +6325,7 @@
           <a:p>
             <a:fld id="{DF03AFA7-18AD-4B78-BBAA-32988282C785}" type="datetimeFigureOut">
               <a:rPr lang="en-US" smtClean="0"/>
-              <a:t>3/15/2015</a:t>
+              <a:t>3/19/2015</a:t>
             </a:fld>
             <a:endParaRPr lang="en-US"/>
           </a:p>
@@ -6871,7 +6871,7 @@
           <a:p>
             <a:fld id="{DF03AFA7-18AD-4B78-BBAA-32988282C785}" type="datetimeFigureOut">
               <a:rPr lang="en-US" smtClean="0"/>
-              <a:t>3/15/2015</a:t>
+              <a:t>3/19/2015</a:t>
             </a:fld>
             <a:endParaRPr lang="en-US"/>
           </a:p>
@@ -7591,7 +7591,7 @@
           <a:p>
             <a:fld id="{DF03AFA7-18AD-4B78-BBAA-32988282C785}" type="datetimeFigureOut">
               <a:rPr lang="en-US" smtClean="0"/>
-              <a:t>3/15/2015</a:t>
+              <a:t>3/19/2015</a:t>
             </a:fld>
             <a:endParaRPr lang="en-US"/>
           </a:p>
@@ -7765,7 +7765,7 @@
           <a:p>
             <a:fld id="{DF03AFA7-18AD-4B78-BBAA-32988282C785}" type="datetimeFigureOut">
               <a:rPr lang="en-US" smtClean="0"/>
-              <a:t>3/15/2015</a:t>
+              <a:t>3/19/2015</a:t>
             </a:fld>
             <a:endParaRPr lang="en-US"/>
           </a:p>
@@ -7945,7 +7945,7 @@
           <a:p>
             <a:fld id="{DF03AFA7-18AD-4B78-BBAA-32988282C785}" type="datetimeFigureOut">
               <a:rPr lang="en-US" smtClean="0"/>
-              <a:t>3/15/2015</a:t>
+              <a:t>3/19/2015</a:t>
             </a:fld>
             <a:endParaRPr lang="en-US"/>
           </a:p>
@@ -8130,7 +8130,7 @@
           <a:p>
             <a:fld id="{DF03AFA7-18AD-4B78-BBAA-32988282C785}" type="datetimeFigureOut">
               <a:rPr lang="en-US" smtClean="0"/>
-              <a:t>3/15/2015</a:t>
+              <a:t>3/19/2015</a:t>
             </a:fld>
             <a:endParaRPr lang="en-US"/>
           </a:p>
@@ -8390,7 +8390,7 @@
           <a:p>
             <a:fld id="{DF03AFA7-18AD-4B78-BBAA-32988282C785}" type="datetimeFigureOut">
               <a:rPr lang="en-US" smtClean="0"/>
-              <a:t>3/15/2015</a:t>
+              <a:t>3/19/2015</a:t>
             </a:fld>
             <a:endParaRPr lang="en-US"/>
           </a:p>
@@ -8622,7 +8622,7 @@
           <a:p>
             <a:fld id="{DF03AFA7-18AD-4B78-BBAA-32988282C785}" type="datetimeFigureOut">
               <a:rPr lang="en-US" smtClean="0"/>
-              <a:t>3/15/2015</a:t>
+              <a:t>3/19/2015</a:t>
             </a:fld>
             <a:endParaRPr lang="en-US"/>
           </a:p>
@@ -9003,7 +9003,7 @@
           <a:p>
             <a:fld id="{DF03AFA7-18AD-4B78-BBAA-32988282C785}" type="datetimeFigureOut">
               <a:rPr lang="en-US" smtClean="0"/>
-              <a:t>3/15/2015</a:t>
+              <a:t>3/19/2015</a:t>
             </a:fld>
             <a:endParaRPr lang="en-US"/>
           </a:p>
@@ -9121,7 +9121,7 @@
           <a:p>
             <a:fld id="{DF03AFA7-18AD-4B78-BBAA-32988282C785}" type="datetimeFigureOut">
               <a:rPr lang="en-US" smtClean="0"/>
-              <a:t>3/15/2015</a:t>
+              <a:t>3/19/2015</a:t>
             </a:fld>
             <a:endParaRPr lang="en-US"/>
           </a:p>
@@ -9216,7 +9216,7 @@
           <a:p>
             <a:fld id="{DF03AFA7-18AD-4B78-BBAA-32988282C785}" type="datetimeFigureOut">
               <a:rPr lang="en-US" smtClean="0"/>
-              <a:t>3/15/2015</a:t>
+              <a:t>3/19/2015</a:t>
             </a:fld>
             <a:endParaRPr lang="en-US"/>
           </a:p>
@@ -9465,7 +9465,7 @@
           <a:p>
             <a:fld id="{DF03AFA7-18AD-4B78-BBAA-32988282C785}" type="datetimeFigureOut">
               <a:rPr lang="en-US" smtClean="0"/>
-              <a:t>3/15/2015</a:t>
+              <a:t>3/19/2015</a:t>
             </a:fld>
             <a:endParaRPr lang="en-US"/>
           </a:p>
@@ -9717,7 +9717,7 @@
           <a:p>
             <a:fld id="{DF03AFA7-18AD-4B78-BBAA-32988282C785}" type="datetimeFigureOut">
               <a:rPr lang="en-US" smtClean="0"/>
-              <a:t>3/15/2015</a:t>
+              <a:t>3/19/2015</a:t>
             </a:fld>
             <a:endParaRPr lang="en-US"/>
           </a:p>
@@ -9840,7 +9840,7 @@
           <a:noFill/>
           <a:extLst>
             <a:ext uri="{909E8E84-426E-40dd-AFC4-6F175D3DCCD1}">
-              <a14:hiddenFill xmlns="" xmlns:a14="http://schemas.microsoft.com/office/drawing/2010/main">
+              <a14:hiddenFill xmlns:a14="http://schemas.microsoft.com/office/drawing/2010/main" xmlns="">
                 <a:solidFill>
                   <a:srgbClr val="FFFFFF"/>
                 </a:solidFill>
@@ -9914,7 +9914,7 @@
               </a:ln>
               <a:extLst>
                 <a:ext uri="{91240B29-F687-4f45-9708-019B960494DF}">
-                  <a14:hiddenLine xmlns="" xmlns:a14="http://schemas.microsoft.com/office/drawing/2010/main" w="9525">
+                  <a14:hiddenLine xmlns:a14="http://schemas.microsoft.com/office/drawing/2010/main" xmlns="" w="9525">
                     <a:solidFill>
                       <a:srgbClr val="000000"/>
                     </a:solidFill>
@@ -10004,7 +10004,7 @@
               </a:ln>
               <a:extLst>
                 <a:ext uri="{91240B29-F687-4f45-9708-019B960494DF}">
-                  <a14:hiddenLine xmlns="" xmlns:a14="http://schemas.microsoft.com/office/drawing/2010/main" w="9525">
+                  <a14:hiddenLine xmlns:a14="http://schemas.microsoft.com/office/drawing/2010/main" xmlns="" w="9525">
                     <a:solidFill>
                       <a:srgbClr val="000000"/>
                     </a:solidFill>
@@ -10094,7 +10094,7 @@
               </a:ln>
               <a:extLst>
                 <a:ext uri="{91240B29-F687-4f45-9708-019B960494DF}">
-                  <a14:hiddenLine xmlns="" xmlns:a14="http://schemas.microsoft.com/office/drawing/2010/main" w="9525">
+                  <a14:hiddenLine xmlns:a14="http://schemas.microsoft.com/office/drawing/2010/main" xmlns="" w="9525">
                     <a:solidFill>
                       <a:srgbClr val="000000"/>
                     </a:solidFill>
@@ -10156,7 +10156,7 @@
               </a:ln>
               <a:extLst>
                 <a:ext uri="{91240B29-F687-4f45-9708-019B960494DF}">
-                  <a14:hiddenLine xmlns="" xmlns:a14="http://schemas.microsoft.com/office/drawing/2010/main" w="9525">
+                  <a14:hiddenLine xmlns:a14="http://schemas.microsoft.com/office/drawing/2010/main" xmlns="" w="9525">
                     <a:solidFill>
                       <a:srgbClr val="000000"/>
                     </a:solidFill>
@@ -10246,7 +10246,7 @@
               </a:ln>
               <a:extLst>
                 <a:ext uri="{91240B29-F687-4f45-9708-019B960494DF}">
-                  <a14:hiddenLine xmlns="" xmlns:a14="http://schemas.microsoft.com/office/drawing/2010/main" w="9525">
+                  <a14:hiddenLine xmlns:a14="http://schemas.microsoft.com/office/drawing/2010/main" xmlns="" w="9525">
                     <a:solidFill>
                       <a:srgbClr val="000000"/>
                     </a:solidFill>
@@ -10308,7 +10308,7 @@
               </a:ln>
               <a:extLst>
                 <a:ext uri="{91240B29-F687-4f45-9708-019B960494DF}">
-                  <a14:hiddenLine xmlns="" xmlns:a14="http://schemas.microsoft.com/office/drawing/2010/main" w="9525">
+                  <a14:hiddenLine xmlns:a14="http://schemas.microsoft.com/office/drawing/2010/main" xmlns="" w="9525">
                     <a:solidFill>
                       <a:srgbClr val="000000"/>
                     </a:solidFill>
@@ -10370,7 +10370,7 @@
               </a:ln>
               <a:extLst>
                 <a:ext uri="{91240B29-F687-4f45-9708-019B960494DF}">
-                  <a14:hiddenLine xmlns="" xmlns:a14="http://schemas.microsoft.com/office/drawing/2010/main" w="9525">
+                  <a14:hiddenLine xmlns:a14="http://schemas.microsoft.com/office/drawing/2010/main" xmlns="" w="9525">
                     <a:solidFill>
                       <a:srgbClr val="000000"/>
                     </a:solidFill>
@@ -10460,7 +10460,7 @@
               </a:ln>
               <a:extLst>
                 <a:ext uri="{91240B29-F687-4f45-9708-019B960494DF}">
-                  <a14:hiddenLine xmlns="" xmlns:a14="http://schemas.microsoft.com/office/drawing/2010/main" w="9525">
+                  <a14:hiddenLine xmlns:a14="http://schemas.microsoft.com/office/drawing/2010/main" xmlns="" w="9525">
                     <a:solidFill>
                       <a:srgbClr val="000000"/>
                     </a:solidFill>
@@ -10550,7 +10550,7 @@
               </a:ln>
               <a:extLst>
                 <a:ext uri="{91240B29-F687-4f45-9708-019B960494DF}">
-                  <a14:hiddenLine xmlns="" xmlns:a14="http://schemas.microsoft.com/office/drawing/2010/main" w="9525">
+                  <a14:hiddenLine xmlns:a14="http://schemas.microsoft.com/office/drawing/2010/main" xmlns="" w="9525">
                     <a:solidFill>
                       <a:srgbClr val="000000"/>
                     </a:solidFill>
@@ -10612,7 +10612,7 @@
               </a:ln>
               <a:extLst>
                 <a:ext uri="{91240B29-F687-4f45-9708-019B960494DF}">
-                  <a14:hiddenLine xmlns="" xmlns:a14="http://schemas.microsoft.com/office/drawing/2010/main" w="9525">
+                  <a14:hiddenLine xmlns:a14="http://schemas.microsoft.com/office/drawing/2010/main" xmlns="" w="9525">
                     <a:solidFill>
                       <a:srgbClr val="000000"/>
                     </a:solidFill>
@@ -10722,7 +10722,7 @@
               </a:ln>
               <a:extLst>
                 <a:ext uri="{91240B29-F687-4f45-9708-019B960494DF}">
-                  <a14:hiddenLine xmlns="" xmlns:a14="http://schemas.microsoft.com/office/drawing/2010/main" w="9525">
+                  <a14:hiddenLine xmlns:a14="http://schemas.microsoft.com/office/drawing/2010/main" xmlns="" w="9525">
                     <a:solidFill>
                       <a:srgbClr val="000000"/>
                     </a:solidFill>
@@ -10806,7 +10806,7 @@
               </a:ln>
               <a:extLst>
                 <a:ext uri="{91240B29-F687-4f45-9708-019B960494DF}">
-                  <a14:hiddenLine xmlns="" xmlns:a14="http://schemas.microsoft.com/office/drawing/2010/main" w="9525">
+                  <a14:hiddenLine xmlns:a14="http://schemas.microsoft.com/office/drawing/2010/main" xmlns="" w="9525">
                     <a:solidFill>
                       <a:srgbClr val="000000"/>
                     </a:solidFill>
@@ -10868,7 +10868,7 @@
               </a:ln>
               <a:extLst>
                 <a:ext uri="{91240B29-F687-4f45-9708-019B960494DF}">
-                  <a14:hiddenLine xmlns="" xmlns:a14="http://schemas.microsoft.com/office/drawing/2010/main" w="9525">
+                  <a14:hiddenLine xmlns:a14="http://schemas.microsoft.com/office/drawing/2010/main" xmlns="" w="9525">
                     <a:solidFill>
                       <a:srgbClr val="000000"/>
                     </a:solidFill>
@@ -10930,7 +10930,7 @@
               </a:ln>
               <a:extLst>
                 <a:ext uri="{91240B29-F687-4f45-9708-019B960494DF}">
-                  <a14:hiddenLine xmlns="" xmlns:a14="http://schemas.microsoft.com/office/drawing/2010/main" w="9525">
+                  <a14:hiddenLine xmlns:a14="http://schemas.microsoft.com/office/drawing/2010/main" xmlns="" w="9525">
                     <a:solidFill>
                       <a:srgbClr val="000000"/>
                     </a:solidFill>
@@ -11020,7 +11020,7 @@
               </a:ln>
               <a:extLst>
                 <a:ext uri="{91240B29-F687-4f45-9708-019B960494DF}">
-                  <a14:hiddenLine xmlns="" xmlns:a14="http://schemas.microsoft.com/office/drawing/2010/main" w="9525">
+                  <a14:hiddenLine xmlns:a14="http://schemas.microsoft.com/office/drawing/2010/main" xmlns="" w="9525">
                     <a:solidFill>
                       <a:srgbClr val="000000"/>
                     </a:solidFill>
@@ -11054,7 +11054,7 @@
               </a:ln>
               <a:extLst>
                 <a:ext uri="{91240B29-F687-4f45-9708-019B960494DF}">
-                  <a14:hiddenLine xmlns="" xmlns:a14="http://schemas.microsoft.com/office/drawing/2010/main" w="9525">
+                  <a14:hiddenLine xmlns:a14="http://schemas.microsoft.com/office/drawing/2010/main" xmlns="" w="9525">
                     <a:solidFill>
                       <a:srgbClr val="000000"/>
                     </a:solidFill>
@@ -11119,7 +11119,7 @@
               </a:ln>
               <a:extLst>
                 <a:ext uri="{91240B29-F687-4f45-9708-019B960494DF}">
-                  <a14:hiddenLine xmlns="" xmlns:a14="http://schemas.microsoft.com/office/drawing/2010/main" w="9525">
+                  <a14:hiddenLine xmlns:a14="http://schemas.microsoft.com/office/drawing/2010/main" xmlns="" w="9525">
                     <a:solidFill>
                       <a:srgbClr val="000000"/>
                     </a:solidFill>
@@ -11209,7 +11209,7 @@
               </a:ln>
               <a:extLst>
                 <a:ext uri="{91240B29-F687-4f45-9708-019B960494DF}">
-                  <a14:hiddenLine xmlns="" xmlns:a14="http://schemas.microsoft.com/office/drawing/2010/main" w="9525">
+                  <a14:hiddenLine xmlns:a14="http://schemas.microsoft.com/office/drawing/2010/main" xmlns="" w="9525">
                     <a:solidFill>
                       <a:srgbClr val="000000"/>
                     </a:solidFill>
@@ -11271,7 +11271,7 @@
               </a:ln>
               <a:extLst>
                 <a:ext uri="{91240B29-F687-4f45-9708-019B960494DF}">
-                  <a14:hiddenLine xmlns="" xmlns:a14="http://schemas.microsoft.com/office/drawing/2010/main" w="9525">
+                  <a14:hiddenLine xmlns:a14="http://schemas.microsoft.com/office/drawing/2010/main" xmlns="" w="9525">
                     <a:solidFill>
                       <a:srgbClr val="000000"/>
                     </a:solidFill>
@@ -11361,7 +11361,7 @@
               </a:ln>
               <a:extLst>
                 <a:ext uri="{91240B29-F687-4f45-9708-019B960494DF}">
-                  <a14:hiddenLine xmlns="" xmlns:a14="http://schemas.microsoft.com/office/drawing/2010/main" w="9525">
+                  <a14:hiddenLine xmlns:a14="http://schemas.microsoft.com/office/drawing/2010/main" xmlns="" w="9525">
                     <a:solidFill>
                       <a:srgbClr val="000000"/>
                     </a:solidFill>
@@ -11426,7 +11426,7 @@
               </a:ln>
               <a:extLst>
                 <a:ext uri="{91240B29-F687-4f45-9708-019B960494DF}">
-                  <a14:hiddenLine xmlns="" xmlns:a14="http://schemas.microsoft.com/office/drawing/2010/main" w="9525">
+                  <a14:hiddenLine xmlns:a14="http://schemas.microsoft.com/office/drawing/2010/main" xmlns="" w="9525">
                     <a:solidFill>
                       <a:srgbClr val="000000"/>
                     </a:solidFill>
@@ -11488,7 +11488,7 @@
               </a:ln>
               <a:extLst>
                 <a:ext uri="{91240B29-F687-4f45-9708-019B960494DF}">
-                  <a14:hiddenLine xmlns="" xmlns:a14="http://schemas.microsoft.com/office/drawing/2010/main" w="9525">
+                  <a14:hiddenLine xmlns:a14="http://schemas.microsoft.com/office/drawing/2010/main" xmlns="" w="9525">
                     <a:solidFill>
                       <a:srgbClr val="000000"/>
                     </a:solidFill>
@@ -11578,7 +11578,7 @@
               </a:ln>
               <a:extLst>
                 <a:ext uri="{91240B29-F687-4f45-9708-019B960494DF}">
-                  <a14:hiddenLine xmlns="" xmlns:a14="http://schemas.microsoft.com/office/drawing/2010/main" w="9525">
+                  <a14:hiddenLine xmlns:a14="http://schemas.microsoft.com/office/drawing/2010/main" xmlns="" w="9525">
                     <a:solidFill>
                       <a:srgbClr val="000000"/>
                     </a:solidFill>
@@ -11668,7 +11668,7 @@
               </a:ln>
               <a:extLst>
                 <a:ext uri="{91240B29-F687-4f45-9708-019B960494DF}">
-                  <a14:hiddenLine xmlns="" xmlns:a14="http://schemas.microsoft.com/office/drawing/2010/main" w="9525">
+                  <a14:hiddenLine xmlns:a14="http://schemas.microsoft.com/office/drawing/2010/main" xmlns="" w="9525">
                     <a:solidFill>
                       <a:srgbClr val="000000"/>
                     </a:solidFill>
@@ -11733,7 +11733,7 @@
               </a:ln>
               <a:extLst>
                 <a:ext uri="{91240B29-F687-4f45-9708-019B960494DF}">
-                  <a14:hiddenLine xmlns="" xmlns:a14="http://schemas.microsoft.com/office/drawing/2010/main" w="9525">
+                  <a14:hiddenLine xmlns:a14="http://schemas.microsoft.com/office/drawing/2010/main" xmlns="" w="9525">
                     <a:solidFill>
                       <a:srgbClr val="000000"/>
                     </a:solidFill>
@@ -11853,7 +11853,7 @@
               </a:ln>
               <a:extLst>
                 <a:ext uri="{91240B29-F687-4f45-9708-019B960494DF}">
-                  <a14:hiddenLine xmlns="" xmlns:a14="http://schemas.microsoft.com/office/drawing/2010/main" w="9525">
+                  <a14:hiddenLine xmlns:a14="http://schemas.microsoft.com/office/drawing/2010/main" xmlns="" w="9525">
                     <a:solidFill>
                       <a:srgbClr val="000000"/>
                     </a:solidFill>
@@ -11934,7 +11934,7 @@
               </a:ln>
               <a:extLst>
                 <a:ext uri="{91240B29-F687-4f45-9708-019B960494DF}">
-                  <a14:hiddenLine xmlns="" xmlns:a14="http://schemas.microsoft.com/office/drawing/2010/main" w="9525">
+                  <a14:hiddenLine xmlns:a14="http://schemas.microsoft.com/office/drawing/2010/main" xmlns="" w="9525">
                     <a:solidFill>
                       <a:srgbClr val="000000"/>
                     </a:solidFill>
@@ -12049,7 +12049,7 @@
               </a:ln>
               <a:extLst>
                 <a:ext uri="{91240B29-F687-4f45-9708-019B960494DF}">
-                  <a14:hiddenLine xmlns="" xmlns:a14="http://schemas.microsoft.com/office/drawing/2010/main" w="9525">
+                  <a14:hiddenLine xmlns:a14="http://schemas.microsoft.com/office/drawing/2010/main" xmlns="" w="9525">
                     <a:solidFill>
                       <a:srgbClr val="000000"/>
                     </a:solidFill>
@@ -12139,7 +12139,7 @@
               </a:ln>
               <a:extLst>
                 <a:ext uri="{91240B29-F687-4f45-9708-019B960494DF}">
-                  <a14:hiddenLine xmlns="" xmlns:a14="http://schemas.microsoft.com/office/drawing/2010/main" w="9525">
+                  <a14:hiddenLine xmlns:a14="http://schemas.microsoft.com/office/drawing/2010/main" xmlns="" w="9525">
                     <a:solidFill>
                       <a:srgbClr val="000000"/>
                     </a:solidFill>
@@ -12204,7 +12204,7 @@
               </a:ln>
               <a:extLst>
                 <a:ext uri="{91240B29-F687-4f45-9708-019B960494DF}">
-                  <a14:hiddenLine xmlns="" xmlns:a14="http://schemas.microsoft.com/office/drawing/2010/main" w="9525">
+                  <a14:hiddenLine xmlns:a14="http://schemas.microsoft.com/office/drawing/2010/main" xmlns="" w="9525">
                     <a:solidFill>
                       <a:srgbClr val="000000"/>
                     </a:solidFill>
@@ -12294,7 +12294,7 @@
               </a:ln>
               <a:extLst>
                 <a:ext uri="{91240B29-F687-4f45-9708-019B960494DF}">
-                  <a14:hiddenLine xmlns="" xmlns:a14="http://schemas.microsoft.com/office/drawing/2010/main" w="9525">
+                  <a14:hiddenLine xmlns:a14="http://schemas.microsoft.com/office/drawing/2010/main" xmlns="" w="9525">
                     <a:solidFill>
                       <a:srgbClr val="000000"/>
                     </a:solidFill>
@@ -12362,7 +12362,7 @@
               </a:ln>
               <a:extLst>
                 <a:ext uri="{91240B29-F687-4f45-9708-019B960494DF}">
-                  <a14:hiddenLine xmlns="" xmlns:a14="http://schemas.microsoft.com/office/drawing/2010/main" w="9525">
+                  <a14:hiddenLine xmlns:a14="http://schemas.microsoft.com/office/drawing/2010/main" xmlns="" w="9525">
                     <a:solidFill>
                       <a:srgbClr val="000000"/>
                     </a:solidFill>
@@ -12452,7 +12452,7 @@
               </a:ln>
               <a:extLst>
                 <a:ext uri="{91240B29-F687-4f45-9708-019B960494DF}">
-                  <a14:hiddenLine xmlns="" xmlns:a14="http://schemas.microsoft.com/office/drawing/2010/main" w="9525">
+                  <a14:hiddenLine xmlns:a14="http://schemas.microsoft.com/office/drawing/2010/main" xmlns="" w="9525">
                     <a:solidFill>
                       <a:srgbClr val="000000"/>
                     </a:solidFill>
@@ -12520,7 +12520,7 @@
               </a:ln>
               <a:extLst>
                 <a:ext uri="{91240B29-F687-4f45-9708-019B960494DF}">
-                  <a14:hiddenLine xmlns="" xmlns:a14="http://schemas.microsoft.com/office/drawing/2010/main" w="9525">
+                  <a14:hiddenLine xmlns:a14="http://schemas.microsoft.com/office/drawing/2010/main" xmlns="" w="9525">
                     <a:solidFill>
                       <a:srgbClr val="000000"/>
                     </a:solidFill>
@@ -12610,7 +12610,7 @@
               </a:ln>
               <a:extLst>
                 <a:ext uri="{91240B29-F687-4f45-9708-019B960494DF}">
-                  <a14:hiddenLine xmlns="" xmlns:a14="http://schemas.microsoft.com/office/drawing/2010/main" w="9525">
+                  <a14:hiddenLine xmlns:a14="http://schemas.microsoft.com/office/drawing/2010/main" xmlns="" w="9525">
                     <a:solidFill>
                       <a:srgbClr val="000000"/>
                     </a:solidFill>
@@ -12644,7 +12644,7 @@
               </a:ln>
               <a:extLst>
                 <a:ext uri="{91240B29-F687-4f45-9708-019B960494DF}">
-                  <a14:hiddenLine xmlns="" xmlns:a14="http://schemas.microsoft.com/office/drawing/2010/main" w="9525">
+                  <a14:hiddenLine xmlns:a14="http://schemas.microsoft.com/office/drawing/2010/main" xmlns="" w="9525">
                     <a:solidFill>
                       <a:srgbClr val="000000"/>
                     </a:solidFill>
@@ -12784,7 +12784,7 @@
           <a:p>
             <a:fld id="{DF03AFA7-18AD-4B78-BBAA-32988282C785}" type="datetimeFigureOut">
               <a:rPr lang="en-US" smtClean="0"/>
-              <a:t>3/15/2015</a:t>
+              <a:t>3/19/2015</a:t>
             </a:fld>
             <a:endParaRPr lang="en-US"/>
           </a:p>
@@ -15275,11 +15275,7 @@
             </a:r>
             <a:r>
               <a:rPr lang="en-US" dirty="0" smtClean="0"/>
-              <a:t>production ready </a:t>
-            </a:r>
-            <a:r>
-              <a:rPr lang="en-US" dirty="0" smtClean="0"/>
-              <a:t>(</a:t>
+              <a:t>production ready (</a:t>
             </a:r>
             <a:r>
               <a:rPr lang="en-US" dirty="0"/>
@@ -16366,7 +16362,12 @@
             <p:ph idx="1"/>
           </p:nvPr>
         </p:nvSpPr>
-        <p:spPr/>
+        <p:spPr>
+          <a:xfrm>
+            <a:off x="838200" y="1524000"/>
+            <a:ext cx="7429499" cy="3541714"/>
+          </a:xfrm>
+        </p:spPr>
         <p:txBody>
           <a:bodyPr>
             <a:normAutofit fontScale="92500" lnSpcReduction="20000"/>
@@ -17998,6 +17999,10 @@
 </file>
 
 <file path=customXml/item1.xml><?xml version="1.0" encoding="utf-8"?>
+<ct:contentTypeSchema xmlns:ct="http://schemas.microsoft.com/office/2006/metadata/contentType" xmlns:ma="http://schemas.microsoft.com/office/2006/metadata/properties/metaAttributes" ct:_="" ma:_="" ma:contentTypeName="TemplateFile" ma:contentTypeID="0x0101006EDDDB5EE6D98C44930B742096920B300400F5B6D36B3EF94B4E9A635CDF2A18F5B8" ma:contentTypeVersion="33" ma:contentTypeDescription="Create a new document." ma:contentTypeScope="" ma:versionID="37d3ec2b48d53e45b233ad8f52fe1b11"/>
+</file>
+
+<file path=customXml/item2.xml><?xml version="1.0" encoding="utf-8"?>
 <?mso-contentType ?>
 <FormTemplates xmlns="http://schemas.microsoft.com/sharepoint/v3/contenttype/forms">
   <Display>DocumentLibraryForm</Display>
@@ -18006,27 +18011,23 @@
 </FormTemplates>
 </file>
 
-<file path=customXml/item2.xml><?xml version="1.0" encoding="utf-8"?>
-<ct:contentTypeSchema xmlns:ct="http://schemas.microsoft.com/office/2006/metadata/contentType" xmlns:ma="http://schemas.microsoft.com/office/2006/metadata/properties/metaAttributes" ct:_="" ma:_="" ma:contentTypeName="TemplateFile" ma:contentTypeID="0x0101006EDDDB5EE6D98C44930B742096920B300400F5B6D36B3EF94B4E9A635CDF2A18F5B8" ma:contentTypeVersion="33" ma:contentTypeDescription="Create a new document." ma:contentTypeScope="" ma:versionID="37d3ec2b48d53e45b233ad8f52fe1b11"/>
-</file>
-
 <file path=customXml/item3.xml><?xml version="1.0" encoding="utf-8"?>
 <p:properties xmlns:p="http://schemas.microsoft.com/office/2006/metadata/properties" xmlns:xsi="http://www.w3.org/2001/XMLSchema-instance" xmlns:pc="http://schemas.microsoft.com/office/infopath/2007/PartnerControls"/>
 </file>
 
 <file path=customXml/itemProps1.xml><?xml version="1.0" encoding="utf-8"?>
-<ds:datastoreItem xmlns:ds="http://schemas.openxmlformats.org/officeDocument/2006/customXml" ds:itemID="{A2811558-6BC1-4787-9D25-279CCB58D20E}">
+<ds:datastoreItem xmlns:ds="http://schemas.openxmlformats.org/officeDocument/2006/customXml" ds:itemID="{DFFB8ED6-C851-474E-BD31-7B8335112982}">
   <ds:schemaRefs>
-    <ds:schemaRef ds:uri="http://schemas.microsoft.com/sharepoint/v3/contenttype/forms"/>
+    <ds:schemaRef ds:uri="http://schemas.microsoft.com/office/2006/metadata/contentType"/>
+    <ds:schemaRef ds:uri="http://schemas.microsoft.com/office/2006/metadata/properties/metaAttributes"/>
   </ds:schemaRefs>
 </ds:datastoreItem>
 </file>
 
 <file path=customXml/itemProps2.xml><?xml version="1.0" encoding="utf-8"?>
-<ds:datastoreItem xmlns:ds="http://schemas.openxmlformats.org/officeDocument/2006/customXml" ds:itemID="{DFFB8ED6-C851-474E-BD31-7B8335112982}">
+<ds:datastoreItem xmlns:ds="http://schemas.openxmlformats.org/officeDocument/2006/customXml" ds:itemID="{A2811558-6BC1-4787-9D25-279CCB58D20E}">
   <ds:schemaRefs>
-    <ds:schemaRef ds:uri="http://schemas.microsoft.com/office/2006/metadata/contentType"/>
-    <ds:schemaRef ds:uri="http://schemas.microsoft.com/office/2006/metadata/properties/metaAttributes"/>
+    <ds:schemaRef ds:uri="http://schemas.microsoft.com/sharepoint/v3/contenttype/forms"/>
   </ds:schemaRefs>
 </ds:datastoreItem>
 </file>

</xml_diff>